<commit_message>
update slide and presion plot
</commit_message>
<xml_diff>
--- a/Discussion/Yerong1601Oct21.pptx
+++ b/Discussion/Yerong1601Oct21.pptx
@@ -5,12 +5,13 @@
     <p:sldMasterId id="2147483648" r:id="rId1"/>
   </p:sldMasterIdLst>
   <p:notesMasterIdLst>
-    <p:notesMasterId r:id="rId6"/>
+    <p:notesMasterId r:id="rId7"/>
   </p:notesMasterIdLst>
   <p:sldIdLst>
     <p:sldId id="290" r:id="rId3"/>
     <p:sldId id="293" r:id="rId4"/>
     <p:sldId id="294" r:id="rId5"/>
+    <p:sldId id="295" r:id="rId6"/>
   </p:sldIdLst>
   <p:sldSz cx="12192000" cy="6858000"/>
   <p:notesSz cx="6858000" cy="9144000"/>
@@ -3310,7 +3311,7 @@
       </p:sp>
       <p:pic>
         <p:nvPicPr>
-          <p:cNvPr id="5" name="Picture 4" descr="precision"/>
+          <p:cNvPr id="4" name="Picture 3" descr="precision"/>
           <p:cNvPicPr>
             <a:picLocks noChangeAspect="1"/>
           </p:cNvPicPr>
@@ -3324,8 +3325,8 @@
         </p:blipFill>
         <p:spPr>
           <a:xfrm>
-            <a:off x="123825" y="208915"/>
-            <a:ext cx="11924665" cy="6474460"/>
+            <a:off x="88900" y="534670"/>
+            <a:ext cx="12474575" cy="5945505"/>
           </a:xfrm>
           <a:prstGeom prst="rect">
             <a:avLst/>
@@ -3397,7 +3398,7 @@
       </p:sp>
       <p:pic>
         <p:nvPicPr>
-          <p:cNvPr id="4" name="Picture 3" descr="phonon"/>
+          <p:cNvPr id="5" name="Picture 4" descr="phonon"/>
           <p:cNvPicPr>
             <a:picLocks noChangeAspect="1"/>
           </p:cNvPicPr>
@@ -3411,8 +3412,8 @@
         </p:blipFill>
         <p:spPr>
           <a:xfrm>
-            <a:off x="213360" y="189865"/>
-            <a:ext cx="12123420" cy="5777865"/>
+            <a:off x="275590" y="548005"/>
+            <a:ext cx="11077575" cy="5279390"/>
           </a:xfrm>
           <a:prstGeom prst="rect">
             <a:avLst/>
@@ -3553,6 +3554,64 @@
                       <a:pPr>
                         <a:buNone/>
                       </a:pPr>
+                      <a:endParaRPr lang="en-US"/>
+                    </a:p>
+                  </a:txBody>
+                  <a:tcPr/>
+                </a:tc>
+                <a:tc>
+                  <a:txBody>
+                    <a:bodyPr/>
+                    <a:p>
+                      <a:pPr>
+                        <a:buNone/>
+                      </a:pPr>
+                      <a:endParaRPr lang="en-US"/>
+                    </a:p>
+                  </a:txBody>
+                  <a:tcPr/>
+                </a:tc>
+                <a:tc>
+                  <a:txBody>
+                    <a:bodyPr/>
+                    <a:p>
+                      <a:pPr>
+                        <a:buNone/>
+                      </a:pPr>
+                      <a:r>
+                        <a:rPr lang="en-US"/>
+                        <a:t>Tod</a:t>
+                      </a:r>
+                      <a:endParaRPr lang="en-US"/>
+                    </a:p>
+                  </a:txBody>
+                  <a:tcPr/>
+                </a:tc>
+                <a:tc>
+                  <a:txBody>
+                    <a:bodyPr/>
+                    <a:p>
+                      <a:pPr>
+                        <a:buNone/>
+                      </a:pPr>
+                      <a:r>
+                        <a:rPr lang="en-US"/>
+                        <a:t>6.6721</a:t>
+                      </a:r>
+                      <a:endParaRPr lang="en-US"/>
+                    </a:p>
+                  </a:txBody>
+                  <a:tcPr/>
+                </a:tc>
+              </a:tr>
+              <a:tr h="888365">
+                <a:tc>
+                  <a:txBody>
+                    <a:bodyPr/>
+                    <a:p>
+                      <a:pPr>
+                        <a:buNone/>
+                      </a:pPr>
                       <a:r>
                         <a:rPr lang="en-US"/>
                         <a:t>QM</a:t>
@@ -3620,6 +3679,12 @@
                       <a:r>
                         <a:rPr lang="en-US"/>
                         <a:t>6.7443</a:t>
+                      </a:r>
+                      <a:r>
+                        <a:rPr lang="en-US" sz="1800">
+                          <a:sym typeface="+mn-ea"/>
+                        </a:rPr>
+                        <a:t>(+1.082%)</a:t>
                       </a:r>
                       <a:endParaRPr lang="en-US"/>
                     </a:p>
@@ -3705,7 +3770,7 @@
                       </a:pPr>
                       <a:r>
                         <a:rPr lang="en-US"/>
-                        <a:t>6.7515</a:t>
+                        <a:t>6.7515(+1.190%)</a:t>
                       </a:r>
                       <a:endParaRPr lang="en-US"/>
                     </a:p>
@@ -3781,7 +3846,7 @@
                       </a:pPr>
                       <a:r>
                         <a:rPr lang="en-US"/>
-                        <a:t>6.7293</a:t>
+                        <a:t>6.7293(+0.857%)</a:t>
                       </a:r>
                       <a:endParaRPr lang="en-US"/>
                     </a:p>
@@ -3857,7 +3922,7 @@
                       </a:pPr>
                       <a:r>
                         <a:rPr lang="en-US"/>
-                        <a:t>6.7277</a:t>
+                        <a:t>6.7277(+0.833%)</a:t>
                       </a:r>
                       <a:endParaRPr lang="en-US"/>
                     </a:p>
@@ -3943,65 +4008,7 @@
                       </a:pPr>
                       <a:r>
                         <a:rPr lang="en-US"/>
-                        <a:t>6.7454</a:t>
-                      </a:r>
-                      <a:endParaRPr lang="en-US"/>
-                    </a:p>
-                  </a:txBody>
-                  <a:tcPr/>
-                </a:tc>
-              </a:tr>
-              <a:tr h="888365">
-                <a:tc>
-                  <a:txBody>
-                    <a:bodyPr/>
-                    <a:p>
-                      <a:pPr>
-                        <a:buNone/>
-                      </a:pPr>
-                      <a:endParaRPr lang="en-US"/>
-                    </a:p>
-                  </a:txBody>
-                  <a:tcPr/>
-                </a:tc>
-                <a:tc>
-                  <a:txBody>
-                    <a:bodyPr/>
-                    <a:p>
-                      <a:pPr>
-                        <a:buNone/>
-                      </a:pPr>
-                      <a:endParaRPr lang="en-US"/>
-                    </a:p>
-                  </a:txBody>
-                  <a:tcPr/>
-                </a:tc>
-                <a:tc>
-                  <a:txBody>
-                    <a:bodyPr/>
-                    <a:p>
-                      <a:pPr>
-                        <a:buNone/>
-                      </a:pPr>
-                      <a:r>
-                        <a:rPr lang="en-US"/>
-                        <a:t>Tod</a:t>
-                      </a:r>
-                      <a:endParaRPr lang="en-US"/>
-                    </a:p>
-                  </a:txBody>
-                  <a:tcPr/>
-                </a:tc>
-                <a:tc>
-                  <a:txBody>
-                    <a:bodyPr/>
-                    <a:p>
-                      <a:pPr>
-                        <a:buNone/>
-                      </a:pPr>
-                      <a:r>
-                        <a:rPr lang="en-US"/>
-                        <a:t>6.6721</a:t>
+                        <a:t>6.7454(+1.086%)</a:t>
                       </a:r>
                       <a:endParaRPr lang="en-US"/>
                     </a:p>
@@ -4013,6 +4020,50 @@
           </a:graphicData>
         </a:graphic>
       </p:graphicFrame>
+    </p:spTree>
+  </p:cSld>
+  <p:clrMapOvr>
+    <a:masterClrMapping/>
+  </p:clrMapOvr>
+</p:sld>
+</file>
+
+<file path=ppt/slides/slide4.xml><?xml version="1.0" encoding="utf-8"?>
+<p:sld xmlns:a="http://schemas.openxmlformats.org/drawingml/2006/main" xmlns:r="http://schemas.openxmlformats.org/officeDocument/2006/relationships" xmlns:p="http://schemas.openxmlformats.org/presentationml/2006/main">
+  <p:cSld>
+    <p:spTree>
+      <p:nvGrpSpPr>
+        <p:cNvPr id="1" name=""/>
+        <p:cNvGrpSpPr/>
+        <p:nvPr/>
+      </p:nvGrpSpPr>
+      <p:grpSpPr/>
+      <p:pic>
+        <p:nvPicPr>
+          <p:cNvPr id="4" name="Content Placeholder 3"/>
+          <p:cNvPicPr>
+            <a:picLocks noChangeAspect="1"/>
+          </p:cNvPicPr>
+          <p:nvPr>
+            <p:ph idx="1"/>
+          </p:nvPr>
+        </p:nvPicPr>
+        <p:blipFill>
+          <a:blip r:embed="rId1"/>
+          <a:stretch>
+            <a:fillRect/>
+          </a:stretch>
+        </p:blipFill>
+        <p:spPr>
+          <a:xfrm>
+            <a:off x="149860" y="2090420"/>
+            <a:ext cx="11690350" cy="2351405"/>
+          </a:xfrm>
+          <a:prstGeom prst="rect">
+            <a:avLst/>
+          </a:prstGeom>
+        </p:spPr>
+      </p:pic>
     </p:spTree>
   </p:cSld>
   <p:clrMapOvr>

</xml_diff>